<commit_message>
change 设计模式 TO Doc 10%
</commit_message>
<xml_diff>
--- a/设计模式(一).pptx
+++ b/设计模式(一).pptx
@@ -283,7 +283,7 @@
           <a:p>
             <a:fld id="{18499C2A-F7B6-49DD-A0C1-45A2D72FFDCF}" type="datetimeFigureOut">
               <a:rPr lang="zh-CN" altLang="en-US" smtClean="0"/>
-              <a:t>2019/9/28</a:t>
+              <a:t>2019/12/1</a:t>
             </a:fld>
             <a:endParaRPr lang="zh-CN" altLang="en-US"/>
           </a:p>
@@ -481,7 +481,7 @@
           <a:p>
             <a:fld id="{18499C2A-F7B6-49DD-A0C1-45A2D72FFDCF}" type="datetimeFigureOut">
               <a:rPr lang="zh-CN" altLang="en-US" smtClean="0"/>
-              <a:t>2019/9/28</a:t>
+              <a:t>2019/12/1</a:t>
             </a:fld>
             <a:endParaRPr lang="zh-CN" altLang="en-US"/>
           </a:p>
@@ -689,7 +689,7 @@
           <a:p>
             <a:fld id="{18499C2A-F7B6-49DD-A0C1-45A2D72FFDCF}" type="datetimeFigureOut">
               <a:rPr lang="zh-CN" altLang="en-US" smtClean="0"/>
-              <a:t>2019/9/28</a:t>
+              <a:t>2019/12/1</a:t>
             </a:fld>
             <a:endParaRPr lang="zh-CN" altLang="en-US"/>
           </a:p>
@@ -802,7 +802,7 @@
           <a:p>
             <a:fld id="{E13947ED-5EF2-47D5-99F5-5EE8E4B8CE26}" type="datetimeFigureOut">
               <a:rPr lang="zh-CN" altLang="en-US" smtClean="0"/>
-              <a:t>2019/9/28</a:t>
+              <a:t>2019/12/1</a:t>
             </a:fld>
             <a:endParaRPr lang="zh-CN" altLang="en-US"/>
           </a:p>
@@ -1036,7 +1036,7 @@
           <a:p>
             <a:fld id="{18499C2A-F7B6-49DD-A0C1-45A2D72FFDCF}" type="datetimeFigureOut">
               <a:rPr lang="zh-CN" altLang="en-US" smtClean="0"/>
-              <a:t>2019/9/28</a:t>
+              <a:t>2019/12/1</a:t>
             </a:fld>
             <a:endParaRPr lang="zh-CN" altLang="en-US"/>
           </a:p>
@@ -1311,7 +1311,7 @@
           <a:p>
             <a:fld id="{18499C2A-F7B6-49DD-A0C1-45A2D72FFDCF}" type="datetimeFigureOut">
               <a:rPr lang="zh-CN" altLang="en-US" smtClean="0"/>
-              <a:t>2019/9/28</a:t>
+              <a:t>2019/12/1</a:t>
             </a:fld>
             <a:endParaRPr lang="zh-CN" altLang="en-US"/>
           </a:p>
@@ -1576,7 +1576,7 @@
           <a:p>
             <a:fld id="{18499C2A-F7B6-49DD-A0C1-45A2D72FFDCF}" type="datetimeFigureOut">
               <a:rPr lang="zh-CN" altLang="en-US" smtClean="0"/>
-              <a:t>2019/9/28</a:t>
+              <a:t>2019/12/1</a:t>
             </a:fld>
             <a:endParaRPr lang="zh-CN" altLang="en-US"/>
           </a:p>
@@ -1988,7 +1988,7 @@
           <a:p>
             <a:fld id="{18499C2A-F7B6-49DD-A0C1-45A2D72FFDCF}" type="datetimeFigureOut">
               <a:rPr lang="zh-CN" altLang="en-US" smtClean="0"/>
-              <a:t>2019/9/28</a:t>
+              <a:t>2019/12/1</a:t>
             </a:fld>
             <a:endParaRPr lang="zh-CN" altLang="en-US"/>
           </a:p>
@@ -2129,7 +2129,7 @@
           <a:p>
             <a:fld id="{18499C2A-F7B6-49DD-A0C1-45A2D72FFDCF}" type="datetimeFigureOut">
               <a:rPr lang="zh-CN" altLang="en-US" smtClean="0"/>
-              <a:t>2019/9/28</a:t>
+              <a:t>2019/12/1</a:t>
             </a:fld>
             <a:endParaRPr lang="zh-CN" altLang="en-US"/>
           </a:p>
@@ -2242,7 +2242,7 @@
           <a:p>
             <a:fld id="{18499C2A-F7B6-49DD-A0C1-45A2D72FFDCF}" type="datetimeFigureOut">
               <a:rPr lang="zh-CN" altLang="en-US" smtClean="0"/>
-              <a:t>2019/9/28</a:t>
+              <a:t>2019/12/1</a:t>
             </a:fld>
             <a:endParaRPr lang="zh-CN" altLang="en-US"/>
           </a:p>
@@ -2553,7 +2553,7 @@
           <a:p>
             <a:fld id="{18499C2A-F7B6-49DD-A0C1-45A2D72FFDCF}" type="datetimeFigureOut">
               <a:rPr lang="zh-CN" altLang="en-US" smtClean="0"/>
-              <a:t>2019/9/28</a:t>
+              <a:t>2019/12/1</a:t>
             </a:fld>
             <a:endParaRPr lang="zh-CN" altLang="en-US"/>
           </a:p>
@@ -2841,7 +2841,7 @@
           <a:p>
             <a:fld id="{18499C2A-F7B6-49DD-A0C1-45A2D72FFDCF}" type="datetimeFigureOut">
               <a:rPr lang="zh-CN" altLang="en-US" smtClean="0"/>
-              <a:t>2019/9/28</a:t>
+              <a:t>2019/12/1</a:t>
             </a:fld>
             <a:endParaRPr lang="zh-CN" altLang="en-US"/>
           </a:p>
@@ -3082,7 +3082,7 @@
           <a:p>
             <a:fld id="{18499C2A-F7B6-49DD-A0C1-45A2D72FFDCF}" type="datetimeFigureOut">
               <a:rPr lang="zh-CN" altLang="en-US" smtClean="0"/>
-              <a:t>2019/9/28</a:t>
+              <a:t>2019/12/1</a:t>
             </a:fld>
             <a:endParaRPr lang="zh-CN" altLang="en-US"/>
           </a:p>
@@ -3592,41 +3592,41 @@
           <a:lstStyle/>
           <a:p>
             <a:r>
-              <a:rPr lang="en-US" altLang="zh-CN" sz="2800">
+              <a:rPr lang="en-US" altLang="zh-CN" sz="2800" dirty="0">
                 <a:latin typeface="SimSun" panose="02010600030101010101" pitchFamily="2" charset="-122"/>
                 <a:ea typeface="SimSun" panose="02010600030101010101" pitchFamily="2" charset="-122"/>
               </a:rPr>
               <a:t>2</a:t>
             </a:r>
             <a:r>
-              <a:rPr lang="zh-CN" altLang="en-US" sz="2800">
+              <a:rPr lang="zh-CN" altLang="en-US" sz="2800" dirty="0">
                 <a:latin typeface="SimSun" panose="02010600030101010101" pitchFamily="2" charset="-122"/>
                 <a:ea typeface="SimSun" panose="02010600030101010101" pitchFamily="2" charset="-122"/>
               </a:rPr>
               <a:t>、策略模式</a:t>
             </a:r>
             <a:r>
-              <a:rPr lang="en-US" altLang="zh-CN" sz="2800">
+              <a:rPr lang="en-US" altLang="zh-CN" sz="2800" dirty="0">
                 <a:latin typeface="SimSun" panose="02010600030101010101" pitchFamily="2" charset="-122"/>
                 <a:ea typeface="SimSun" panose="02010600030101010101" pitchFamily="2" charset="-122"/>
               </a:rPr>
               <a:t>(Str</a:t>
             </a:r>
             <a:r>
-              <a:rPr lang="en-US" altLang="zh-CN" sz="2800" u="sng">
+              <a:rPr lang="en-US" altLang="zh-CN" sz="2800" u="sng" dirty="0">
                 <a:latin typeface="SimSun" panose="02010600030101010101" pitchFamily="2" charset="-122"/>
                 <a:ea typeface="SimSun" panose="02010600030101010101" pitchFamily="2" charset="-122"/>
               </a:rPr>
               <a:t>at</a:t>
             </a:r>
             <a:r>
-              <a:rPr lang="en-US" altLang="zh-CN" sz="2800">
+              <a:rPr lang="en-US" altLang="zh-CN" sz="2800" dirty="0">
                 <a:latin typeface="SimSun" panose="02010600030101010101" pitchFamily="2" charset="-122"/>
                 <a:ea typeface="SimSun" panose="02010600030101010101" pitchFamily="2" charset="-122"/>
               </a:rPr>
               <a:t>egy Pattern)</a:t>
             </a:r>
-            <a:endParaRPr lang="zh-CN" altLang="en-US" sz="2800">
+            <a:endParaRPr lang="zh-CN" altLang="en-US" sz="2800" dirty="0">
               <a:latin typeface="SimSun" panose="02010600030101010101" pitchFamily="2" charset="-122"/>
               <a:ea typeface="SimSun" panose="02010600030101010101" pitchFamily="2" charset="-122"/>
             </a:endParaRPr>
@@ -3662,27 +3662,27 @@
           <a:lstStyle/>
           <a:p>
             <a:r>
-              <a:rPr lang="en-US" altLang="zh-CN" sz="2800">
+              <a:rPr lang="en-US" altLang="zh-CN" sz="2800" dirty="0">
                 <a:latin typeface="SimSun" panose="02010600030101010101" pitchFamily="2" charset="-122"/>
                 <a:ea typeface="SimSun" panose="02010600030101010101" pitchFamily="2" charset="-122"/>
               </a:rPr>
               <a:t>7</a:t>
             </a:r>
             <a:r>
-              <a:rPr lang="zh-CN" altLang="en-US" sz="2800">
+              <a:rPr lang="zh-CN" altLang="en-US" sz="2800" dirty="0">
                 <a:latin typeface="SimSun" panose="02010600030101010101" pitchFamily="2" charset="-122"/>
                 <a:ea typeface="SimSun" panose="02010600030101010101" pitchFamily="2" charset="-122"/>
               </a:rPr>
               <a:t>、装饰者模式</a:t>
             </a:r>
             <a:r>
-              <a:rPr lang="en-US" altLang="zh-CN" sz="2800">
+              <a:rPr lang="en-US" altLang="zh-CN" sz="2800" dirty="0">
                 <a:latin typeface="SimSun" panose="02010600030101010101" pitchFamily="2" charset="-122"/>
                 <a:ea typeface="SimSun" panose="02010600030101010101" pitchFamily="2" charset="-122"/>
               </a:rPr>
               <a:t>(Decoration Pattern)</a:t>
             </a:r>
-            <a:endParaRPr lang="zh-CN" altLang="en-US" sz="2800">
+            <a:endParaRPr lang="zh-CN" altLang="en-US" sz="2800" dirty="0">
               <a:latin typeface="SimSun" panose="02010600030101010101" pitchFamily="2" charset="-122"/>
               <a:ea typeface="SimSun" panose="02010600030101010101" pitchFamily="2" charset="-122"/>
             </a:endParaRPr>
@@ -3718,14 +3718,14 @@
           <a:lstStyle/>
           <a:p>
             <a:r>
-              <a:rPr lang="en-US" altLang="zh-CN" sz="2800">
+              <a:rPr lang="en-US" altLang="zh-CN" sz="2800" dirty="0">
                 <a:latin typeface="SimSun" panose="02010600030101010101" pitchFamily="2" charset="-122"/>
                 <a:ea typeface="SimSun" panose="02010600030101010101" pitchFamily="2" charset="-122"/>
               </a:rPr>
               <a:t>1</a:t>
             </a:r>
             <a:r>
-              <a:rPr lang="zh-CN" altLang="en-US" sz="2800">
+              <a:rPr lang="zh-CN" altLang="en-US" sz="2800" dirty="0">
                 <a:latin typeface="SimSun" panose="02010600030101010101" pitchFamily="2" charset="-122"/>
                 <a:ea typeface="SimSun" panose="02010600030101010101" pitchFamily="2" charset="-122"/>
               </a:rPr>
@@ -3763,27 +3763,27 @@
           <a:lstStyle/>
           <a:p>
             <a:r>
-              <a:rPr lang="en-US" altLang="zh-CN" sz="2800">
+              <a:rPr lang="en-US" altLang="zh-CN" sz="2800" dirty="0">
                 <a:latin typeface="SimSun" panose="02010600030101010101" pitchFamily="2" charset="-122"/>
                 <a:ea typeface="SimSun" panose="02010600030101010101" pitchFamily="2" charset="-122"/>
               </a:rPr>
               <a:t>6</a:t>
             </a:r>
             <a:r>
-              <a:rPr lang="zh-CN" altLang="en-US" sz="2800">
+              <a:rPr lang="zh-CN" altLang="en-US" sz="2800" dirty="0">
                 <a:latin typeface="SimSun" panose="02010600030101010101" pitchFamily="2" charset="-122"/>
                 <a:ea typeface="SimSun" panose="02010600030101010101" pitchFamily="2" charset="-122"/>
               </a:rPr>
               <a:t>、单例模式</a:t>
             </a:r>
             <a:r>
-              <a:rPr lang="en-US" altLang="zh-CN" sz="2800">
+              <a:rPr lang="en-US" altLang="zh-CN" sz="2800" dirty="0">
                 <a:latin typeface="SimSun" panose="02010600030101010101" pitchFamily="2" charset="-122"/>
                 <a:ea typeface="SimSun" panose="02010600030101010101" pitchFamily="2" charset="-122"/>
               </a:rPr>
               <a:t>(Singleton Pattern)</a:t>
             </a:r>
-            <a:endParaRPr lang="zh-CN" altLang="en-US" sz="2800">
+            <a:endParaRPr lang="zh-CN" altLang="en-US" sz="2800" dirty="0">
               <a:latin typeface="SimSun" panose="02010600030101010101" pitchFamily="2" charset="-122"/>
               <a:ea typeface="SimSun" panose="02010600030101010101" pitchFamily="2" charset="-122"/>
             </a:endParaRPr>
@@ -3819,14 +3819,14 @@
           <a:lstStyle/>
           <a:p>
             <a:r>
-              <a:rPr lang="en-US" altLang="zh-CN" sz="2800">
+              <a:rPr lang="en-US" altLang="zh-CN" sz="2800" dirty="0">
                 <a:latin typeface="SimSun" panose="02010600030101010101" pitchFamily="2" charset="-122"/>
                 <a:ea typeface="SimSun" panose="02010600030101010101" pitchFamily="2" charset="-122"/>
               </a:rPr>
               <a:t>4</a:t>
             </a:r>
             <a:r>
-              <a:rPr lang="zh-CN" altLang="en-US" sz="2800">
+              <a:rPr lang="zh-CN" altLang="en-US" sz="2800" dirty="0">
                 <a:latin typeface="SimSun" panose="02010600030101010101" pitchFamily="2" charset="-122"/>
                 <a:ea typeface="SimSun" panose="02010600030101010101" pitchFamily="2" charset="-122"/>
               </a:rPr>
@@ -3840,20 +3840,20 @@
               <a:t>模板方法</a:t>
             </a:r>
             <a:r>
-              <a:rPr lang="zh-CN" altLang="en-US" sz="2800">
+              <a:rPr lang="zh-CN" altLang="en-US" sz="2800" dirty="0">
                 <a:latin typeface="SimSun" panose="02010600030101010101" pitchFamily="2" charset="-122"/>
                 <a:ea typeface="SimSun" panose="02010600030101010101" pitchFamily="2" charset="-122"/>
               </a:rPr>
               <a:t>模式</a:t>
             </a:r>
             <a:r>
-              <a:rPr lang="en-US" altLang="zh-CN" sz="2800">
+              <a:rPr lang="en-US" altLang="zh-CN" sz="2800" dirty="0">
                 <a:latin typeface="SimSun" panose="02010600030101010101" pitchFamily="2" charset="-122"/>
                 <a:ea typeface="SimSun" panose="02010600030101010101" pitchFamily="2" charset="-122"/>
               </a:rPr>
               <a:t>(Template Pattern)</a:t>
             </a:r>
-            <a:endParaRPr lang="zh-CN" altLang="en-US" sz="2800">
+            <a:endParaRPr lang="zh-CN" altLang="en-US" sz="2800" dirty="0">
               <a:latin typeface="SimSun" panose="02010600030101010101" pitchFamily="2" charset="-122"/>
               <a:ea typeface="SimSun" panose="02010600030101010101" pitchFamily="2" charset="-122"/>
             </a:endParaRPr>
@@ -3889,14 +3889,14 @@
           <a:lstStyle/>
           <a:p>
             <a:r>
-              <a:rPr lang="en-US" altLang="zh-CN" sz="2800">
+              <a:rPr lang="en-US" altLang="zh-CN" sz="2800" dirty="0">
                 <a:latin typeface="SimSun" panose="02010600030101010101" pitchFamily="2" charset="-122"/>
                 <a:ea typeface="SimSun" panose="02010600030101010101" pitchFamily="2" charset="-122"/>
               </a:rPr>
               <a:t>5</a:t>
             </a:r>
             <a:r>
-              <a:rPr lang="zh-CN" altLang="en-US" sz="2800">
+              <a:rPr lang="zh-CN" altLang="en-US" sz="2800" dirty="0">
                 <a:latin typeface="SimSun" panose="02010600030101010101" pitchFamily="2" charset="-122"/>
                 <a:ea typeface="SimSun" panose="02010600030101010101" pitchFamily="2" charset="-122"/>
               </a:rPr>
@@ -3910,7 +3910,7 @@
               <a:t>策略</a:t>
             </a:r>
             <a:r>
-              <a:rPr lang="en-US" altLang="zh-CN" sz="2800">
+              <a:rPr lang="en-US" altLang="zh-CN" sz="2800" dirty="0">
                 <a:latin typeface="SimSun" panose="02010600030101010101" pitchFamily="2" charset="-122"/>
                 <a:ea typeface="SimSun" panose="02010600030101010101" pitchFamily="2" charset="-122"/>
               </a:rPr>
@@ -3924,7 +3924,7 @@
               <a:t>模板</a:t>
             </a:r>
             <a:r>
-              <a:rPr lang="en-US" altLang="zh-CN" sz="2800">
+              <a:rPr lang="en-US" altLang="zh-CN" sz="2800" dirty="0">
                 <a:latin typeface="SimSun" panose="02010600030101010101" pitchFamily="2" charset="-122"/>
                 <a:ea typeface="SimSun" panose="02010600030101010101" pitchFamily="2" charset="-122"/>
               </a:rPr>
@@ -3937,7 +3937,7 @@
               </a:rPr>
               <a:t>工厂</a:t>
             </a:r>
-            <a:endParaRPr lang="en-US" sz="2800">
+            <a:endParaRPr lang="en-US" sz="2800" dirty="0">
               <a:latin typeface="SimSun" panose="02010600030101010101" pitchFamily="2" charset="-122"/>
               <a:ea typeface="SimSun" panose="02010600030101010101" pitchFamily="2" charset="-122"/>
             </a:endParaRPr>
@@ -3973,14 +3973,14 @@
           <a:lstStyle/>
           <a:p>
             <a:r>
-              <a:rPr lang="en-US" altLang="zh-CN" sz="2800">
+              <a:rPr lang="en-US" altLang="zh-CN" sz="2800" dirty="0">
                 <a:latin typeface="SimSun" panose="02010600030101010101" pitchFamily="2" charset="-122"/>
                 <a:ea typeface="SimSun" panose="02010600030101010101" pitchFamily="2" charset="-122"/>
               </a:rPr>
               <a:t>3</a:t>
             </a:r>
             <a:r>
-              <a:rPr lang="zh-CN" altLang="en-US" sz="2800">
+              <a:rPr lang="zh-CN" altLang="en-US" sz="2800" dirty="0">
                 <a:latin typeface="SimSun" panose="02010600030101010101" pitchFamily="2" charset="-122"/>
                 <a:ea typeface="SimSun" panose="02010600030101010101" pitchFamily="2" charset="-122"/>
               </a:rPr>
@@ -3994,13 +3994,13 @@
               <a:t>工厂模式</a:t>
             </a:r>
             <a:r>
-              <a:rPr lang="en-US" altLang="ja-JP" sz="2800">
+              <a:rPr lang="en-US" altLang="ja-JP" sz="2800" dirty="0">
                 <a:latin typeface="SimSun" panose="02010600030101010101" pitchFamily="2" charset="-122"/>
                 <a:ea typeface="SimSun" panose="02010600030101010101" pitchFamily="2" charset="-122"/>
               </a:rPr>
               <a:t>(Factory Pattern)</a:t>
             </a:r>
-            <a:endParaRPr lang="en-US" sz="2800">
+            <a:endParaRPr lang="en-US" sz="2800" dirty="0">
               <a:latin typeface="SimSun" panose="02010600030101010101" pitchFamily="2" charset="-122"/>
               <a:ea typeface="SimSun" panose="02010600030101010101" pitchFamily="2" charset="-122"/>
             </a:endParaRPr>
@@ -5053,11 +5053,11 @@
           <a:lstStyle/>
           <a:p>
             <a:r>
-              <a:rPr lang="en-US" altLang="zh-CN"/>
+              <a:rPr lang="en-US" altLang="zh-CN" dirty="0"/>
               <a:t>1</a:t>
             </a:r>
             <a:r>
-              <a:rPr lang="zh-CN" altLang="en-US"/>
+              <a:rPr lang="zh-CN" altLang="en-US" dirty="0"/>
               <a:t>、找出应用中可能需要变化之处，把它们独立出来，不要和那些不需要变化的代码混在一起</a:t>
             </a:r>
           </a:p>
@@ -5092,11 +5092,11 @@
           <a:lstStyle/>
           <a:p>
             <a:r>
-              <a:rPr lang="en-US" altLang="zh-CN"/>
+              <a:rPr lang="en-US" altLang="zh-CN" dirty="0"/>
               <a:t>2</a:t>
             </a:r>
             <a:r>
-              <a:rPr lang="zh-CN" altLang="en-US"/>
+              <a:rPr lang="zh-CN" altLang="en-US" dirty="0"/>
               <a:t>、多用组合，少用继承</a:t>
             </a:r>
           </a:p>
@@ -5131,19 +5131,19 @@
           <a:lstStyle/>
           <a:p>
             <a:r>
-              <a:rPr lang="en-US" altLang="zh-CN"/>
+              <a:rPr lang="en-US" altLang="zh-CN" dirty="0"/>
               <a:t>3</a:t>
             </a:r>
             <a:r>
-              <a:rPr lang="zh-CN" altLang="en-US"/>
+              <a:rPr lang="zh-CN" altLang="en-US" dirty="0"/>
               <a:t>、依赖倒转原则</a:t>
             </a:r>
             <a:r>
-              <a:rPr lang="en-US" altLang="zh-CN"/>
+              <a:rPr lang="en-US" altLang="zh-CN" dirty="0"/>
               <a:t>(Dependency Inversion Principle, DIP)</a:t>
             </a:r>
             <a:r>
-              <a:rPr lang="zh-CN" altLang="en-US"/>
+              <a:rPr lang="zh-CN" altLang="en-US" dirty="0"/>
               <a:t>：针对接口编程，不针对实现编程</a:t>
             </a:r>
           </a:p>
@@ -5178,11 +5178,11 @@
           <a:lstStyle/>
           <a:p>
             <a:r>
-              <a:rPr lang="en-US" altLang="zh-CN"/>
+              <a:rPr lang="en-US" altLang="zh-CN" dirty="0"/>
               <a:t>4</a:t>
             </a:r>
             <a:r>
-              <a:rPr lang="zh-CN" altLang="en-US"/>
+              <a:rPr lang="zh-CN" altLang="en-US" dirty="0"/>
               <a:t>、为了交互对象之间的松耦合设计而努力</a:t>
             </a:r>
           </a:p>
@@ -5217,19 +5217,19 @@
           <a:lstStyle/>
           <a:p>
             <a:r>
-              <a:rPr lang="en-US" altLang="zh-CN"/>
+              <a:rPr lang="en-US" altLang="zh-CN" dirty="0"/>
               <a:t>5</a:t>
             </a:r>
             <a:r>
-              <a:rPr lang="zh-CN" altLang="en-US"/>
+              <a:rPr lang="zh-CN" altLang="en-US" dirty="0"/>
               <a:t>、开闭原则</a:t>
             </a:r>
             <a:r>
-              <a:rPr lang="en-US" altLang="zh-CN"/>
+              <a:rPr lang="en-US" altLang="zh-CN" dirty="0"/>
               <a:t>(Open-Closed Principle, OCP)</a:t>
             </a:r>
             <a:r>
-              <a:rPr lang="zh-CN" altLang="en-US"/>
+              <a:rPr lang="zh-CN" altLang="en-US" dirty="0"/>
               <a:t>：类应该对扩展开放，对修改关闭。应尽量在不修改原有代码的情况下进行扩展</a:t>
             </a:r>
           </a:p>
@@ -5264,11 +5264,11 @@
           <a:lstStyle/>
           <a:p>
             <a:r>
-              <a:rPr lang="en-US" altLang="zh-CN"/>
+              <a:rPr lang="en-US" altLang="zh-CN" dirty="0"/>
               <a:t>6</a:t>
             </a:r>
             <a:r>
-              <a:rPr lang="zh-CN" altLang="en-US"/>
+              <a:rPr lang="zh-CN" altLang="en-US" dirty="0"/>
               <a:t>、里氏代换原则(Liskov Substitution Principle, LSP)：所有引用基类（父类）的地方必须能透明地使用其子类的对象。要依赖抽象，不要依赖具体类</a:t>
             </a:r>
           </a:p>
@@ -5303,19 +5303,27 @@
           <a:lstStyle/>
           <a:p>
             <a:r>
-              <a:rPr lang="en-US" altLang="zh-CN"/>
+              <a:rPr lang="en-US" altLang="zh-CN" dirty="0"/>
               <a:t>7</a:t>
             </a:r>
             <a:r>
-              <a:rPr lang="zh-CN" altLang="en-US"/>
+              <a:rPr lang="zh-CN" altLang="en-US" dirty="0"/>
               <a:t>、迪米特法则</a:t>
             </a:r>
             <a:r>
-              <a:rPr lang="en-US" altLang="zh-CN"/>
-              <a:t>(Law of Demeter, LoD)</a:t>
-            </a:r>
-            <a:r>
-              <a:rPr lang="zh-CN" altLang="en-US"/>
+              <a:rPr lang="en-US" altLang="zh-CN" dirty="0"/>
+              <a:t>(Law of Demeter, </a:t>
+            </a:r>
+            <a:r>
+              <a:rPr lang="en-US" altLang="zh-CN" dirty="0" err="1"/>
+              <a:t>LoD</a:t>
+            </a:r>
+            <a:r>
+              <a:rPr lang="en-US" altLang="zh-CN" dirty="0"/>
+              <a:t>)</a:t>
+            </a:r>
+            <a:r>
+              <a:rPr lang="zh-CN" altLang="en-US" dirty="0"/>
               <a:t>：一个软件实体应当尽可能少地与其他实体发生相互作用。：最少知识原则，只和朋友交谈</a:t>
             </a:r>
           </a:p>
@@ -5350,11 +5358,11 @@
           <a:lstStyle/>
           <a:p>
             <a:r>
-              <a:rPr lang="en-US" altLang="zh-CN"/>
+              <a:rPr lang="en-US" altLang="zh-CN" dirty="0"/>
               <a:t>8</a:t>
             </a:r>
             <a:r>
-              <a:rPr lang="zh-CN" altLang="en-US"/>
+              <a:rPr lang="zh-CN" altLang="en-US" dirty="0"/>
               <a:t>、好莱坞原则：别调用高层，让高层调用低层</a:t>
             </a:r>
           </a:p>
@@ -5389,19 +5397,19 @@
           <a:lstStyle/>
           <a:p>
             <a:r>
-              <a:rPr lang="en-US" altLang="zh-CN"/>
+              <a:rPr lang="en-US" altLang="zh-CN" dirty="0"/>
               <a:t>10</a:t>
             </a:r>
             <a:r>
-              <a:rPr lang="zh-CN" altLang="en-US"/>
+              <a:rPr lang="zh-CN" altLang="en-US" dirty="0"/>
               <a:t>、单一职责原则</a:t>
             </a:r>
             <a:r>
-              <a:rPr lang="en-US" altLang="zh-CN"/>
+              <a:rPr lang="en-US" altLang="zh-CN" dirty="0"/>
               <a:t>(Single Responsibility Principle, SRP)</a:t>
             </a:r>
             <a:r>
-              <a:rPr lang="zh-CN" altLang="en-US"/>
+              <a:rPr lang="zh-CN" altLang="en-US" dirty="0"/>
               <a:t>：单一责任，一个类应该只有一个引起变化的原因</a:t>
             </a:r>
           </a:p>
@@ -5435,11 +5443,11 @@
           <a:lstStyle/>
           <a:p>
             <a:r>
-              <a:rPr lang="en-US" altLang="zh-CN"/>
+              <a:rPr lang="en-US" altLang="zh-CN" dirty="0"/>
               <a:t>9</a:t>
             </a:r>
             <a:r>
-              <a:rPr lang="zh-CN" altLang="en-US"/>
+              <a:rPr lang="zh-CN" altLang="en-US" dirty="0"/>
               <a:t>、接口隔离原则(Interface Segregation Principle, ISP)：使用多个专门的接口，而不使用单一的总接口，即客户端不应该依赖那些它不需要的接口。</a:t>
             </a:r>
           </a:p>
@@ -5552,7 +5560,7 @@
           <a:lstStyle/>
           <a:p>
             <a:r>
-              <a:rPr lang="zh-CN" altLang="en-US"/>
+              <a:rPr lang="zh-CN" altLang="en-US" dirty="0"/>
               <a:t>定义了算法族，分别封装起来，让他们之间可以互相替换，此模式让算法的变化独立于算法的客户。</a:t>
             </a:r>
           </a:p>
@@ -5680,7 +5688,7 @@
           <a:lstStyle/>
           <a:p>
             <a:r>
-              <a:rPr lang="en-US" altLang="zh-CN" sz="1100">
+              <a:rPr lang="en-US" altLang="zh-CN" sz="1100" dirty="0">
                 <a:solidFill>
                   <a:srgbClr val="000088"/>
                 </a:solidFill>
@@ -5689,7 +5697,7 @@
               <a:t>public</a:t>
             </a:r>
             <a:r>
-              <a:rPr lang="en-US" altLang="zh-CN" sz="1100">
+              <a:rPr lang="en-US" altLang="zh-CN" sz="1100" dirty="0">
                 <a:solidFill>
                   <a:srgbClr val="000000"/>
                 </a:solidFill>
@@ -5698,7 +5706,7 @@
               <a:t> </a:t>
             </a:r>
             <a:r>
-              <a:rPr lang="en-US" altLang="zh-CN" sz="1100">
+              <a:rPr lang="en-US" altLang="zh-CN" sz="1100" dirty="0">
                 <a:solidFill>
                   <a:srgbClr val="000088"/>
                 </a:solidFill>
@@ -5707,27 +5715,45 @@
               <a:t>interface</a:t>
             </a:r>
             <a:r>
-              <a:rPr lang="en-US" altLang="zh-CN" sz="1100">
+              <a:rPr lang="en-US" altLang="zh-CN" sz="1100" dirty="0">
                 <a:solidFill>
                   <a:srgbClr val="000000"/>
                 </a:solidFill>
                 <a:latin typeface="Consolas" panose="020B0609020204030204" pitchFamily="49" charset="0"/>
               </a:rPr>
-              <a:t> CalPrice { </a:t>
-            </a:r>
-          </a:p>
-          <a:p>
-            <a:r>
-              <a:rPr lang="en-US" altLang="zh-CN" sz="1100">
+              <a:t> </a:t>
+            </a:r>
+            <a:r>
+              <a:rPr lang="en-US" altLang="zh-CN" sz="1100" dirty="0" err="1">
                 <a:solidFill>
                   <a:srgbClr val="000000"/>
                 </a:solidFill>
                 <a:latin typeface="Consolas" panose="020B0609020204030204" pitchFamily="49" charset="0"/>
               </a:rPr>
+              <a:t>CalPrice</a:t>
+            </a:r>
+            <a:r>
+              <a:rPr lang="en-US" altLang="zh-CN" sz="1100" dirty="0">
+                <a:solidFill>
+                  <a:srgbClr val="000000"/>
+                </a:solidFill>
+                <a:latin typeface="Consolas" panose="020B0609020204030204" pitchFamily="49" charset="0"/>
+              </a:rPr>
+              <a:t> { </a:t>
+            </a:r>
+          </a:p>
+          <a:p>
+            <a:r>
+              <a:rPr lang="en-US" altLang="zh-CN" sz="1100" dirty="0">
+                <a:solidFill>
+                  <a:srgbClr val="000000"/>
+                </a:solidFill>
+                <a:latin typeface="Consolas" panose="020B0609020204030204" pitchFamily="49" charset="0"/>
+              </a:rPr>
               <a:t>	</a:t>
             </a:r>
             <a:r>
-              <a:rPr lang="en-US" altLang="zh-CN" sz="1100">
+              <a:rPr lang="en-US" altLang="zh-CN" sz="1100" dirty="0">
                 <a:solidFill>
                   <a:srgbClr val="880000"/>
                 </a:solidFill>
@@ -5736,7 +5762,7 @@
               <a:t>//</a:t>
             </a:r>
             <a:r>
-              <a:rPr lang="zh-CN" altLang="en-US" sz="1100">
+              <a:rPr lang="zh-CN" altLang="en-US" sz="1100" dirty="0">
                 <a:solidFill>
                   <a:srgbClr val="880000"/>
                 </a:solidFill>
@@ -5745,7 +5771,7 @@
               <a:t>根据原价返回一个最终的价格</a:t>
             </a:r>
             <a:r>
-              <a:rPr lang="zh-CN" altLang="en-US" sz="1100">
+              <a:rPr lang="zh-CN" altLang="en-US" sz="1100" dirty="0">
                 <a:solidFill>
                   <a:srgbClr val="000000"/>
                 </a:solidFill>
@@ -5754,7 +5780,7 @@
               <a:t> </a:t>
             </a:r>
             <a:r>
-              <a:rPr lang="en-US" altLang="zh-CN" sz="1100">
+              <a:rPr lang="en-US" altLang="zh-CN" sz="1100" dirty="0">
                 <a:solidFill>
                   <a:srgbClr val="000000"/>
                 </a:solidFill>
@@ -5765,26 +5791,62 @@
           </a:p>
           <a:p>
             <a:r>
-              <a:rPr lang="en-US" altLang="zh-CN" sz="1100">
+              <a:rPr lang="en-US" altLang="zh-CN" sz="1100" dirty="0">
                 <a:solidFill>
                   <a:srgbClr val="000000"/>
                 </a:solidFill>
                 <a:latin typeface="Consolas" panose="020B0609020204030204" pitchFamily="49" charset="0"/>
               </a:rPr>
-              <a:t>	Double calPrice(Double orgnicPrice); </a:t>
-            </a:r>
-          </a:p>
-          <a:p>
-            <a:r>
-              <a:rPr lang="en-US" altLang="zh-CN" sz="1100">
+              <a:t>	Double </a:t>
+            </a:r>
+            <a:r>
+              <a:rPr lang="en-US" altLang="zh-CN" sz="1100" dirty="0" err="1">
                 <a:solidFill>
                   <a:srgbClr val="000000"/>
                 </a:solidFill>
                 <a:latin typeface="Consolas" panose="020B0609020204030204" pitchFamily="49" charset="0"/>
               </a:rPr>
+              <a:t>calPrice</a:t>
+            </a:r>
+            <a:r>
+              <a:rPr lang="en-US" altLang="zh-CN" sz="1100" dirty="0">
+                <a:solidFill>
+                  <a:srgbClr val="000000"/>
+                </a:solidFill>
+                <a:latin typeface="Consolas" panose="020B0609020204030204" pitchFamily="49" charset="0"/>
+              </a:rPr>
+              <a:t>(Double </a:t>
+            </a:r>
+            <a:r>
+              <a:rPr lang="en-US" altLang="zh-CN" sz="1100" dirty="0" err="1">
+                <a:solidFill>
+                  <a:srgbClr val="000000"/>
+                </a:solidFill>
+                <a:latin typeface="Consolas" panose="020B0609020204030204" pitchFamily="49" charset="0"/>
+              </a:rPr>
+              <a:t>orgnicPrice</a:t>
+            </a:r>
+            <a:r>
+              <a:rPr lang="en-US" altLang="zh-CN" sz="1100" dirty="0">
+                <a:solidFill>
+                  <a:srgbClr val="000000"/>
+                </a:solidFill>
+                <a:latin typeface="Consolas" panose="020B0609020204030204" pitchFamily="49" charset="0"/>
+              </a:rPr>
+              <a:t>); </a:t>
+            </a:r>
+          </a:p>
+          <a:p>
+            <a:r>
+              <a:rPr lang="en-US" altLang="zh-CN" sz="1100" dirty="0">
+                <a:solidFill>
+                  <a:srgbClr val="000000"/>
+                </a:solidFill>
+                <a:latin typeface="Consolas" panose="020B0609020204030204" pitchFamily="49" charset="0"/>
+              </a:rPr>
               <a:t>}</a:t>
             </a:r>
-            <a:endParaRPr lang="zh-CN" altLang="en-US" sz="1100"/>
+            <a:endParaRPr lang="zh-CN" altLang="en-US" sz="1100" dirty="0"/>
           </a:p>
         </p:txBody>
       </p:sp>
@@ -6064,7 +6126,7 @@
           <a:lstStyle/>
           <a:p>
             <a:r>
-              <a:rPr lang="en-US" altLang="zh-CN" sz="1100">
+              <a:rPr lang="en-US" altLang="zh-CN" sz="1100" dirty="0">
                 <a:solidFill>
                   <a:srgbClr val="000088"/>
                 </a:solidFill>
@@ -6073,7 +6135,7 @@
               <a:t>public</a:t>
             </a:r>
             <a:r>
-              <a:rPr lang="en-US" altLang="zh-CN" sz="1100">
+              <a:rPr lang="en-US" altLang="zh-CN" sz="1100" dirty="0">
                 <a:solidFill>
                   <a:srgbClr val="000000"/>
                 </a:solidFill>
@@ -6082,7 +6144,7 @@
               <a:t> </a:t>
             </a:r>
             <a:r>
-              <a:rPr lang="en-US" altLang="zh-CN" sz="1100">
+              <a:rPr lang="en-US" altLang="zh-CN" sz="1100" dirty="0">
                 <a:solidFill>
                   <a:srgbClr val="000088"/>
                 </a:solidFill>
@@ -6091,7 +6153,7 @@
               <a:t>class</a:t>
             </a:r>
             <a:r>
-              <a:rPr lang="en-US" altLang="zh-CN" sz="1100">
+              <a:rPr lang="en-US" altLang="zh-CN" sz="1100" dirty="0">
                 <a:solidFill>
                   <a:srgbClr val="000000"/>
                 </a:solidFill>
@@ -6100,7 +6162,7 @@
               <a:t> </a:t>
             </a:r>
             <a:r>
-              <a:rPr lang="en-US" altLang="zh-CN" sz="1100">
+              <a:rPr lang="en-US" altLang="zh-CN" sz="1100" dirty="0" err="1">
                 <a:solidFill>
                   <a:srgbClr val="4F4F4F"/>
                 </a:solidFill>
@@ -6109,7 +6171,7 @@
               <a:t>Vip</a:t>
             </a:r>
             <a:r>
-              <a:rPr lang="en-US" altLang="zh-CN" sz="1100">
+              <a:rPr lang="en-US" altLang="zh-CN" sz="1100" dirty="0">
                 <a:solidFill>
                   <a:srgbClr val="000000"/>
                 </a:solidFill>
@@ -6118,7 +6180,7 @@
               <a:t> </a:t>
             </a:r>
             <a:r>
-              <a:rPr lang="en-US" altLang="zh-CN" sz="1100">
+              <a:rPr lang="en-US" altLang="zh-CN" sz="1100" dirty="0">
                 <a:solidFill>
                   <a:srgbClr val="000088"/>
                 </a:solidFill>
@@ -6127,7 +6189,7 @@
               <a:t>implements</a:t>
             </a:r>
             <a:r>
-              <a:rPr lang="en-US" altLang="zh-CN" sz="1100">
+              <a:rPr lang="en-US" altLang="zh-CN" sz="1100" dirty="0">
                 <a:solidFill>
                   <a:srgbClr val="000000"/>
                 </a:solidFill>
@@ -6136,7 +6198,7 @@
               <a:t> </a:t>
             </a:r>
             <a:r>
-              <a:rPr lang="en-US" altLang="zh-CN" sz="1100">
+              <a:rPr lang="en-US" altLang="zh-CN" sz="1100" dirty="0" err="1">
                 <a:solidFill>
                   <a:srgbClr val="4F4F4F"/>
                 </a:solidFill>
@@ -6145,7 +6207,7 @@
               <a:t>CalPrice</a:t>
             </a:r>
             <a:r>
-              <a:rPr lang="en-US" altLang="zh-CN" sz="1100">
+              <a:rPr lang="en-US" altLang="zh-CN" sz="1100" dirty="0">
                 <a:solidFill>
                   <a:srgbClr val="000000"/>
                 </a:solidFill>
@@ -6156,7 +6218,7 @@
           </a:p>
           <a:p>
             <a:r>
-              <a:rPr lang="en-US" altLang="zh-CN" sz="1100">
+              <a:rPr lang="en-US" altLang="zh-CN" sz="1100" dirty="0">
                 <a:solidFill>
                   <a:srgbClr val="000000"/>
                 </a:solidFill>
@@ -6165,7 +6227,7 @@
               <a:t>	</a:t>
             </a:r>
             <a:r>
-              <a:rPr lang="en-US" altLang="zh-CN" sz="1100">
+              <a:rPr lang="en-US" altLang="zh-CN" sz="1100" dirty="0">
                 <a:solidFill>
                   <a:srgbClr val="9B859D"/>
                 </a:solidFill>
@@ -6174,7 +6236,7 @@
               <a:t>@Override</a:t>
             </a:r>
             <a:r>
-              <a:rPr lang="en-US" altLang="zh-CN" sz="1100">
+              <a:rPr lang="en-US" altLang="zh-CN" sz="1100" dirty="0">
                 <a:solidFill>
                   <a:srgbClr val="000000"/>
                 </a:solidFill>
@@ -6183,7 +6245,7 @@
               <a:t> </a:t>
             </a:r>
             <a:r>
-              <a:rPr lang="en-US" altLang="zh-CN" sz="1100">
+              <a:rPr lang="en-US" altLang="zh-CN" sz="1100" dirty="0">
                 <a:solidFill>
                   <a:srgbClr val="000088"/>
                 </a:solidFill>
@@ -6192,7 +6254,7 @@
               <a:t>public</a:t>
             </a:r>
             <a:r>
-              <a:rPr lang="en-US" altLang="zh-CN" sz="1100">
+              <a:rPr lang="en-US" altLang="zh-CN" sz="1100" dirty="0">
                 <a:solidFill>
                   <a:srgbClr val="000000"/>
                 </a:solidFill>
@@ -6201,7 +6263,7 @@
               <a:t> Double </a:t>
             </a:r>
             <a:r>
-              <a:rPr lang="en-US" altLang="zh-CN" sz="1100">
+              <a:rPr lang="en-US" altLang="zh-CN" sz="1100" dirty="0" err="1">
                 <a:solidFill>
                   <a:srgbClr val="009900"/>
                 </a:solidFill>
@@ -6210,27 +6272,45 @@
               <a:t>calPrice</a:t>
             </a:r>
             <a:r>
-              <a:rPr lang="en-US" altLang="zh-CN" sz="1100">
+              <a:rPr lang="en-US" altLang="zh-CN" sz="1100" dirty="0">
                 <a:solidFill>
                   <a:srgbClr val="000000"/>
                 </a:solidFill>
                 <a:latin typeface="Consolas" panose="020B0609020204030204" pitchFamily="49" charset="0"/>
               </a:rPr>
-              <a:t>(Double orgnicPrice) { </a:t>
-            </a:r>
-          </a:p>
-          <a:p>
-            <a:r>
-              <a:rPr lang="en-US" altLang="zh-CN" sz="1100">
+              <a:t>(Double </a:t>
+            </a:r>
+            <a:r>
+              <a:rPr lang="en-US" altLang="zh-CN" sz="1100" dirty="0" err="1">
                 <a:solidFill>
                   <a:srgbClr val="000000"/>
                 </a:solidFill>
                 <a:latin typeface="Consolas" panose="020B0609020204030204" pitchFamily="49" charset="0"/>
               </a:rPr>
+              <a:t>orgnicPrice</a:t>
+            </a:r>
+            <a:r>
+              <a:rPr lang="en-US" altLang="zh-CN" sz="1100" dirty="0">
+                <a:solidFill>
+                  <a:srgbClr val="000000"/>
+                </a:solidFill>
+                <a:latin typeface="Consolas" panose="020B0609020204030204" pitchFamily="49" charset="0"/>
+              </a:rPr>
+              <a:t>) { </a:t>
+            </a:r>
+          </a:p>
+          <a:p>
+            <a:r>
+              <a:rPr lang="en-US" altLang="zh-CN" sz="1100" dirty="0">
+                <a:solidFill>
+                  <a:srgbClr val="000000"/>
+                </a:solidFill>
+                <a:latin typeface="Consolas" panose="020B0609020204030204" pitchFamily="49" charset="0"/>
+              </a:rPr>
               <a:t>		</a:t>
             </a:r>
             <a:r>
-              <a:rPr lang="en-US" altLang="zh-CN" sz="1100">
+              <a:rPr lang="en-US" altLang="zh-CN" sz="1100" dirty="0">
                 <a:solidFill>
                   <a:srgbClr val="000088"/>
                 </a:solidFill>
@@ -6239,16 +6319,34 @@
               <a:t>return</a:t>
             </a:r>
             <a:r>
-              <a:rPr lang="en-US" altLang="zh-CN" sz="1100">
+              <a:rPr lang="en-US" altLang="zh-CN" sz="1100" dirty="0">
                 <a:solidFill>
                   <a:srgbClr val="000000"/>
                 </a:solidFill>
                 <a:latin typeface="Consolas" panose="020B0609020204030204" pitchFamily="49" charset="0"/>
               </a:rPr>
-              <a:t> orgnicPrice * </a:t>
-            </a:r>
-            <a:r>
-              <a:rPr lang="en-US" altLang="zh-CN" sz="1100">
+              <a:t> </a:t>
+            </a:r>
+            <a:r>
+              <a:rPr lang="en-US" altLang="zh-CN" sz="1100" dirty="0" err="1">
+                <a:solidFill>
+                  <a:srgbClr val="000000"/>
+                </a:solidFill>
+                <a:latin typeface="Consolas" panose="020B0609020204030204" pitchFamily="49" charset="0"/>
+              </a:rPr>
+              <a:t>orgnicPrice</a:t>
+            </a:r>
+            <a:r>
+              <a:rPr lang="en-US" altLang="zh-CN" sz="1100" dirty="0">
+                <a:solidFill>
+                  <a:srgbClr val="000000"/>
+                </a:solidFill>
+                <a:latin typeface="Consolas" panose="020B0609020204030204" pitchFamily="49" charset="0"/>
+              </a:rPr>
+              <a:t> * </a:t>
+            </a:r>
+            <a:r>
+              <a:rPr lang="en-US" altLang="zh-CN" sz="1100" dirty="0">
                 <a:solidFill>
                   <a:srgbClr val="006666"/>
                 </a:solidFill>
@@ -6257,7 +6355,7 @@
               <a:t>0.9</a:t>
             </a:r>
             <a:r>
-              <a:rPr lang="en-US" altLang="zh-CN" sz="1100">
+              <a:rPr lang="en-US" altLang="zh-CN" sz="1100" dirty="0">
                 <a:solidFill>
                   <a:srgbClr val="000000"/>
                 </a:solidFill>
@@ -6268,7 +6366,7 @@
           </a:p>
           <a:p>
             <a:r>
-              <a:rPr lang="en-US" altLang="zh-CN" sz="1100">
+              <a:rPr lang="en-US" altLang="zh-CN" sz="1100" dirty="0">
                 <a:solidFill>
                   <a:srgbClr val="000000"/>
                 </a:solidFill>
@@ -6279,7 +6377,7 @@
           </a:p>
           <a:p>
             <a:r>
-              <a:rPr lang="en-US" altLang="zh-CN" sz="1100">
+              <a:rPr lang="en-US" altLang="zh-CN" sz="1100" dirty="0">
                 <a:solidFill>
                   <a:srgbClr val="000000"/>
                 </a:solidFill>
@@ -6287,7 +6385,7 @@
               </a:rPr>
               <a:t>}</a:t>
             </a:r>
-            <a:endParaRPr lang="zh-CN" altLang="en-US" sz="1100"/>
+            <a:endParaRPr lang="zh-CN" altLang="en-US" sz="1100" dirty="0"/>
           </a:p>
         </p:txBody>
       </p:sp>
@@ -6474,14 +6572,14 @@
           <a:lstStyle/>
           <a:p>
             <a:r>
-              <a:rPr lang="zh-CN" altLang="en-US"/>
+              <a:rPr lang="zh-CN" altLang="en-US" dirty="0"/>
               <a:t>策略模式在</a:t>
             </a:r>
             <a:r>
-              <a:rPr lang="en-US" altLang="zh-CN"/>
+              <a:rPr lang="en-US" altLang="zh-CN" dirty="0"/>
               <a:t>Spring boot</a:t>
             </a:r>
-            <a:endParaRPr lang="zh-CN" altLang="en-US"/>
+            <a:endParaRPr lang="zh-CN" altLang="en-US" dirty="0"/>
           </a:p>
         </p:txBody>
       </p:sp>

</xml_diff>